<commit_message>
Adecuación al reporte de monitoreo del mes de Abril del 2016
</commit_message>
<xml_diff>
--- a/Proyectos/2016/Métricas y monitoreo/Reporte_monitoreo_2016.pptx
+++ b/Proyectos/2016/Métricas y monitoreo/Reporte_monitoreo_2016.pptx
@@ -130,6 +130,11 @@
       </a:defRPr>
     </a:lvl9pPr>
   </p:defaultTextStyle>
+  <p:extLst>
+    <p:ext uri="{EFAFB233-063F-42B5-8137-9DF3F51BA10A}">
+      <p15:sldGuideLst xmlns:p15="http://schemas.microsoft.com/office/powerpoint/2012/main"/>
+    </p:ext>
+  </p:extLst>
 </p:presentation>
 </file>
 
@@ -462,11 +467,11 @@
         </c:dLbls>
         <c:gapWidth val="219"/>
         <c:overlap val="-27"/>
-        <c:axId val="333315528"/>
-        <c:axId val="333317096"/>
+        <c:axId val="219828376"/>
+        <c:axId val="218765512"/>
       </c:barChart>
       <c:catAx>
-        <c:axId val="333315528"/>
+        <c:axId val="219828376"/>
         <c:scaling>
           <c:orientation val="minMax"/>
         </c:scaling>
@@ -484,7 +489,7 @@
             <a:round/>
           </a:ln>
         </c:spPr>
-        <c:crossAx val="333317096"/>
+        <c:crossAx val="218765512"/>
         <c:crosses val="autoZero"/>
         <c:auto val="1"/>
         <c:lblAlgn val="ctr"/>
@@ -492,7 +497,7 @@
         <c:noMultiLvlLbl val="1"/>
       </c:catAx>
       <c:valAx>
-        <c:axId val="333317096"/>
+        <c:axId val="218765512"/>
         <c:scaling>
           <c:orientation val="minMax"/>
         </c:scaling>
@@ -517,7 +522,7 @@
             <a:noFill/>
           </a:ln>
         </c:spPr>
-        <c:crossAx val="333315528"/>
+        <c:crossAx val="219828376"/>
         <c:crosses val="autoZero"/>
         <c:crossBetween val="between"/>
       </c:valAx>
@@ -679,11 +684,11 @@
           <c:showBubbleSize val="0"/>
         </c:dLbls>
         <c:gapWidth val="100"/>
-        <c:axId val="332389576"/>
-        <c:axId val="332391928"/>
+        <c:axId val="220066344"/>
+        <c:axId val="220067128"/>
       </c:barChart>
       <c:catAx>
-        <c:axId val="332389576"/>
+        <c:axId val="220066344"/>
         <c:scaling>
           <c:orientation val="minMax"/>
         </c:scaling>
@@ -700,7 +705,7 @@
             </a:solidFill>
           </a:ln>
         </c:spPr>
-        <c:crossAx val="332391928"/>
+        <c:crossAx val="220067128"/>
         <c:crosses val="autoZero"/>
         <c:auto val="1"/>
         <c:lblAlgn val="ctr"/>
@@ -708,7 +713,7 @@
         <c:noMultiLvlLbl val="1"/>
       </c:catAx>
       <c:valAx>
-        <c:axId val="332391928"/>
+        <c:axId val="220067128"/>
         <c:scaling>
           <c:orientation val="minMax"/>
         </c:scaling>
@@ -734,7 +739,7 @@
             </a:solidFill>
           </a:ln>
         </c:spPr>
-        <c:crossAx val="332389576"/>
+        <c:crossAx val="220066344"/>
         <c:crosses val="autoZero"/>
         <c:crossBetween val="between"/>
       </c:valAx>
@@ -749,7 +754,6 @@
     </c:plotArea>
     <c:legend>
       <c:legendPos val="r"/>
-      <c:layout/>
       <c:overlay val="0"/>
       <c:spPr>
         <a:noFill/>
@@ -907,11 +911,11 @@
           <c:showBubbleSize val="0"/>
         </c:dLbls>
         <c:gapWidth val="100"/>
-        <c:axId val="398101944"/>
-        <c:axId val="398090968"/>
+        <c:axId val="220067520"/>
+        <c:axId val="220067912"/>
       </c:barChart>
       <c:catAx>
-        <c:axId val="398101944"/>
+        <c:axId val="220067520"/>
         <c:scaling>
           <c:orientation val="minMax"/>
         </c:scaling>
@@ -928,7 +932,7 @@
             </a:solidFill>
           </a:ln>
         </c:spPr>
-        <c:crossAx val="398090968"/>
+        <c:crossAx val="220067912"/>
         <c:crosses val="autoZero"/>
         <c:auto val="1"/>
         <c:lblAlgn val="ctr"/>
@@ -936,7 +940,7 @@
         <c:noMultiLvlLbl val="1"/>
       </c:catAx>
       <c:valAx>
-        <c:axId val="398090968"/>
+        <c:axId val="220067912"/>
         <c:scaling>
           <c:orientation val="minMax"/>
         </c:scaling>
@@ -962,7 +966,7 @@
             </a:solidFill>
           </a:ln>
         </c:spPr>
-        <c:crossAx val="398101944"/>
+        <c:crossAx val="220067520"/>
         <c:crosses val="autoZero"/>
         <c:crossBetween val="between"/>
       </c:valAx>
@@ -977,7 +981,6 @@
     </c:plotArea>
     <c:legend>
       <c:legendPos val="r"/>
-      <c:layout/>
       <c:overlay val="0"/>
       <c:spPr>
         <a:noFill/>
@@ -1147,11 +1150,11 @@
           <c:showBubbleSize val="0"/>
         </c:dLbls>
         <c:gapWidth val="100"/>
-        <c:axId val="332311088"/>
-        <c:axId val="332306384"/>
+        <c:axId val="220068696"/>
+        <c:axId val="220070656"/>
       </c:barChart>
       <c:catAx>
-        <c:axId val="332311088"/>
+        <c:axId val="220068696"/>
         <c:scaling>
           <c:orientation val="minMax"/>
         </c:scaling>
@@ -1168,7 +1171,7 @@
             </a:solidFill>
           </a:ln>
         </c:spPr>
-        <c:crossAx val="332306384"/>
+        <c:crossAx val="220070656"/>
         <c:crosses val="autoZero"/>
         <c:auto val="1"/>
         <c:lblAlgn val="ctr"/>
@@ -1176,7 +1179,7 @@
         <c:noMultiLvlLbl val="1"/>
       </c:catAx>
       <c:valAx>
-        <c:axId val="332306384"/>
+        <c:axId val="220070656"/>
         <c:scaling>
           <c:orientation val="minMax"/>
         </c:scaling>
@@ -1202,7 +1205,7 @@
             </a:solidFill>
           </a:ln>
         </c:spPr>
-        <c:crossAx val="332311088"/>
+        <c:crossAx val="220068696"/>
         <c:crosses val="autoZero"/>
         <c:crossBetween val="between"/>
       </c:valAx>
@@ -1217,7 +1220,6 @@
     </c:plotArea>
     <c:legend>
       <c:legendPos val="r"/>
-      <c:layout/>
       <c:overlay val="0"/>
       <c:spPr>
         <a:noFill/>
@@ -1375,11 +1377,11 @@
           <c:showBubbleSize val="0"/>
         </c:dLbls>
         <c:gapWidth val="100"/>
-        <c:axId val="330929976"/>
-        <c:axId val="330934288"/>
+        <c:axId val="220069872"/>
+        <c:axId val="220071048"/>
       </c:barChart>
       <c:catAx>
-        <c:axId val="330929976"/>
+        <c:axId val="220069872"/>
         <c:scaling>
           <c:orientation val="minMax"/>
         </c:scaling>
@@ -1396,7 +1398,7 @@
             </a:solidFill>
           </a:ln>
         </c:spPr>
-        <c:crossAx val="330934288"/>
+        <c:crossAx val="220071048"/>
         <c:crosses val="autoZero"/>
         <c:auto val="1"/>
         <c:lblAlgn val="ctr"/>
@@ -1404,7 +1406,7 @@
         <c:noMultiLvlLbl val="1"/>
       </c:catAx>
       <c:valAx>
-        <c:axId val="330934288"/>
+        <c:axId val="220071048"/>
         <c:scaling>
           <c:orientation val="minMax"/>
         </c:scaling>
@@ -1430,7 +1432,7 @@
             </a:solidFill>
           </a:ln>
         </c:spPr>
-        <c:crossAx val="330929976"/>
+        <c:crossAx val="220069872"/>
         <c:crosses val="autoZero"/>
         <c:crossBetween val="between"/>
       </c:valAx>
@@ -1445,7 +1447,6 @@
     </c:plotArea>
     <c:legend>
       <c:legendPos val="r"/>
-      <c:layout/>
       <c:overlay val="0"/>
       <c:spPr>
         <a:noFill/>
@@ -1592,11 +1593,11 @@
           <c:showBubbleSize val="0"/>
         </c:dLbls>
         <c:gapWidth val="100"/>
-        <c:axId val="333319056"/>
-        <c:axId val="333313176"/>
+        <c:axId val="220072616"/>
+        <c:axId val="220066736"/>
       </c:barChart>
       <c:catAx>
-        <c:axId val="333319056"/>
+        <c:axId val="220072616"/>
         <c:scaling>
           <c:orientation val="minMax"/>
         </c:scaling>
@@ -1613,7 +1614,7 @@
             </a:solidFill>
           </a:ln>
         </c:spPr>
-        <c:crossAx val="333313176"/>
+        <c:crossAx val="220066736"/>
         <c:crosses val="autoZero"/>
         <c:auto val="1"/>
         <c:lblAlgn val="ctr"/>
@@ -1621,7 +1622,7 @@
         <c:noMultiLvlLbl val="1"/>
       </c:catAx>
       <c:valAx>
-        <c:axId val="333313176"/>
+        <c:axId val="220066736"/>
         <c:scaling>
           <c:orientation val="minMax"/>
         </c:scaling>
@@ -1647,7 +1648,7 @@
             </a:solidFill>
           </a:ln>
         </c:spPr>
-        <c:crossAx val="333319056"/>
+        <c:crossAx val="220072616"/>
         <c:crosses val="autoZero"/>
         <c:crossBetween val="between"/>
       </c:valAx>
@@ -1662,7 +1663,6 @@
     </c:plotArea>
     <c:legend>
       <c:legendPos val="r"/>
-      <c:layout/>
       <c:overlay val="0"/>
       <c:spPr>
         <a:noFill/>
@@ -1986,11 +1986,11 @@
         </c:dLbls>
         <c:gapWidth val="219"/>
         <c:overlap val="-27"/>
-        <c:axId val="399928592"/>
-        <c:axId val="399918400"/>
+        <c:axId val="220761440"/>
+        <c:axId val="220761048"/>
       </c:barChart>
       <c:catAx>
-        <c:axId val="399928592"/>
+        <c:axId val="220761440"/>
         <c:scaling>
           <c:orientation val="minMax"/>
         </c:scaling>
@@ -2008,7 +2008,7 @@
             <a:round/>
           </a:ln>
         </c:spPr>
-        <c:crossAx val="399918400"/>
+        <c:crossAx val="220761048"/>
         <c:crosses val="autoZero"/>
         <c:auto val="1"/>
         <c:lblAlgn val="ctr"/>
@@ -2016,7 +2016,7 @@
         <c:noMultiLvlLbl val="1"/>
       </c:catAx>
       <c:valAx>
-        <c:axId val="399918400"/>
+        <c:axId val="220761048"/>
         <c:scaling>
           <c:orientation val="minMax"/>
         </c:scaling>
@@ -2041,7 +2041,7 @@
             <a:noFill/>
           </a:ln>
         </c:spPr>
-        <c:crossAx val="399928592"/>
+        <c:crossAx val="220761440"/>
         <c:crosses val="autoZero"/>
         <c:crossBetween val="between"/>
       </c:valAx>
@@ -2054,7 +2054,6 @@
     </c:plotArea>
     <c:legend>
       <c:legendPos val="b"/>
-      <c:layout/>
       <c:overlay val="0"/>
       <c:spPr>
         <a:noFill/>
@@ -2230,11 +2229,11 @@
         </c:dLbls>
         <c:gapWidth val="219"/>
         <c:overlap val="-27"/>
-        <c:axId val="328860520"/>
-        <c:axId val="328860128"/>
+        <c:axId val="308011336"/>
+        <c:axId val="308011728"/>
       </c:barChart>
       <c:catAx>
-        <c:axId val="328860520"/>
+        <c:axId val="308011336"/>
         <c:scaling>
           <c:orientation val="minMax"/>
         </c:scaling>
@@ -2252,7 +2251,7 @@
             <a:round/>
           </a:ln>
         </c:spPr>
-        <c:crossAx val="328860128"/>
+        <c:crossAx val="308011728"/>
         <c:crosses val="autoZero"/>
         <c:auto val="1"/>
         <c:lblAlgn val="ctr"/>
@@ -2260,7 +2259,7 @@
         <c:noMultiLvlLbl val="1"/>
       </c:catAx>
       <c:valAx>
-        <c:axId val="328860128"/>
+        <c:axId val="308011728"/>
         <c:scaling>
           <c:orientation val="minMax"/>
           <c:max val="1"/>
@@ -2287,7 +2286,7 @@
             <a:noFill/>
           </a:ln>
         </c:spPr>
-        <c:crossAx val="328860520"/>
+        <c:crossAx val="308011336"/>
         <c:crosses val="autoZero"/>
         <c:crossBetween val="between"/>
       </c:valAx>
@@ -2425,11 +2424,11 @@
         </c:dLbls>
         <c:gapWidth val="219"/>
         <c:overlap val="-27"/>
-        <c:axId val="399926632"/>
-        <c:axId val="399922320"/>
+        <c:axId val="220757128"/>
+        <c:axId val="220763400"/>
       </c:barChart>
       <c:catAx>
-        <c:axId val="399926632"/>
+        <c:axId val="220757128"/>
         <c:scaling>
           <c:orientation val="minMax"/>
         </c:scaling>
@@ -2447,7 +2446,7 @@
             <a:round/>
           </a:ln>
         </c:spPr>
-        <c:crossAx val="399922320"/>
+        <c:crossAx val="220763400"/>
         <c:crosses val="autoZero"/>
         <c:auto val="1"/>
         <c:lblAlgn val="ctr"/>
@@ -2455,7 +2454,7 @@
         <c:noMultiLvlLbl val="1"/>
       </c:catAx>
       <c:valAx>
-        <c:axId val="399922320"/>
+        <c:axId val="220763400"/>
         <c:scaling>
           <c:orientation val="minMax"/>
         </c:scaling>
@@ -2480,7 +2479,7 @@
             <a:noFill/>
           </a:ln>
         </c:spPr>
-        <c:crossAx val="399926632"/>
+        <c:crossAx val="220757128"/>
         <c:crosses val="autoZero"/>
         <c:crossBetween val="between"/>
       </c:valAx>
@@ -2632,11 +2631,11 @@
           <c:showBubbleSize val="0"/>
         </c:dLbls>
         <c:gapWidth val="100"/>
-        <c:axId val="330932720"/>
-        <c:axId val="330933504"/>
+        <c:axId val="220762224"/>
+        <c:axId val="220759872"/>
       </c:barChart>
       <c:catAx>
-        <c:axId val="330932720"/>
+        <c:axId val="220762224"/>
         <c:scaling>
           <c:orientation val="minMax"/>
         </c:scaling>
@@ -2653,7 +2652,7 @@
             </a:solidFill>
           </a:ln>
         </c:spPr>
-        <c:crossAx val="330933504"/>
+        <c:crossAx val="220759872"/>
         <c:crosses val="autoZero"/>
         <c:auto val="1"/>
         <c:lblAlgn val="ctr"/>
@@ -2661,7 +2660,7 @@
         <c:noMultiLvlLbl val="1"/>
       </c:catAx>
       <c:valAx>
-        <c:axId val="330933504"/>
+        <c:axId val="220759872"/>
         <c:scaling>
           <c:orientation val="minMax"/>
         </c:scaling>
@@ -2687,7 +2686,7 @@
             </a:solidFill>
           </a:ln>
         </c:spPr>
-        <c:crossAx val="330932720"/>
+        <c:crossAx val="220762224"/>
         <c:crosses val="autoZero"/>
         <c:crossBetween val="between"/>
       </c:valAx>
@@ -2702,7 +2701,6 @@
     </c:plotArea>
     <c:legend>
       <c:legendPos val="r"/>
-      <c:layout/>
       <c:overlay val="0"/>
       <c:spPr>
         <a:noFill/>
@@ -2898,11 +2896,11 @@
         </c:dLbls>
         <c:gapWidth val="219"/>
         <c:overlap val="-27"/>
-        <c:axId val="333327288"/>
-        <c:axId val="333326504"/>
+        <c:axId val="219578512"/>
+        <c:axId val="219150696"/>
       </c:barChart>
       <c:catAx>
-        <c:axId val="333327288"/>
+        <c:axId val="219578512"/>
         <c:scaling>
           <c:orientation val="minMax"/>
         </c:scaling>
@@ -2920,7 +2918,7 @@
             <a:round/>
           </a:ln>
         </c:spPr>
-        <c:crossAx val="333326504"/>
+        <c:crossAx val="219150696"/>
         <c:crosses val="autoZero"/>
         <c:auto val="1"/>
         <c:lblAlgn val="ctr"/>
@@ -2928,7 +2926,7 @@
         <c:noMultiLvlLbl val="1"/>
       </c:catAx>
       <c:valAx>
-        <c:axId val="333326504"/>
+        <c:axId val="219150696"/>
         <c:scaling>
           <c:orientation val="minMax"/>
         </c:scaling>
@@ -2953,7 +2951,7 @@
             <a:noFill/>
           </a:ln>
         </c:spPr>
-        <c:crossAx val="333327288"/>
+        <c:crossAx val="219578512"/>
         <c:crosses val="autoZero"/>
         <c:crossBetween val="between"/>
       </c:valAx>
@@ -3265,11 +3263,11 @@
           <c:showBubbleSize val="0"/>
         </c:dLbls>
         <c:gapWidth val="100"/>
-        <c:axId val="332393888"/>
-        <c:axId val="332390360"/>
+        <c:axId val="219148344"/>
+        <c:axId val="219152656"/>
       </c:barChart>
       <c:catAx>
-        <c:axId val="332393888"/>
+        <c:axId val="219148344"/>
         <c:scaling>
           <c:orientation val="minMax"/>
         </c:scaling>
@@ -3286,7 +3284,7 @@
             </a:solidFill>
           </a:ln>
         </c:spPr>
-        <c:crossAx val="332390360"/>
+        <c:crossAx val="219152656"/>
         <c:crosses val="autoZero"/>
         <c:auto val="1"/>
         <c:lblAlgn val="ctr"/>
@@ -3294,7 +3292,7 @@
         <c:noMultiLvlLbl val="1"/>
       </c:catAx>
       <c:valAx>
-        <c:axId val="332390360"/>
+        <c:axId val="219152656"/>
         <c:scaling>
           <c:orientation val="minMax"/>
         </c:scaling>
@@ -3320,7 +3318,7 @@
             </a:solidFill>
           </a:ln>
         </c:spPr>
-        <c:crossAx val="332393888"/>
+        <c:crossAx val="219148344"/>
         <c:crosses val="autoZero"/>
         <c:crossBetween val="between"/>
       </c:valAx>
@@ -3541,11 +3539,11 @@
           <c:showBubbleSize val="0"/>
         </c:dLbls>
         <c:gapWidth val="100"/>
-        <c:axId val="332312264"/>
-        <c:axId val="329813744"/>
+        <c:axId val="219153048"/>
+        <c:axId val="219148736"/>
       </c:barChart>
       <c:catAx>
-        <c:axId val="332312264"/>
+        <c:axId val="219153048"/>
         <c:scaling>
           <c:orientation val="minMax"/>
         </c:scaling>
@@ -3562,7 +3560,7 @@
             </a:solidFill>
           </a:ln>
         </c:spPr>
-        <c:crossAx val="329813744"/>
+        <c:crossAx val="219148736"/>
         <c:crosses val="autoZero"/>
         <c:auto val="1"/>
         <c:lblAlgn val="ctr"/>
@@ -3570,7 +3568,7 @@
         <c:noMultiLvlLbl val="1"/>
       </c:catAx>
       <c:valAx>
-        <c:axId val="329813744"/>
+        <c:axId val="219148736"/>
         <c:scaling>
           <c:orientation val="minMax"/>
         </c:scaling>
@@ -3596,7 +3594,7 @@
             </a:solidFill>
           </a:ln>
         </c:spPr>
-        <c:crossAx val="332312264"/>
+        <c:crossAx val="219153048"/>
         <c:crosses val="autoZero"/>
         <c:crossBetween val="between"/>
       </c:valAx>
@@ -3918,11 +3916,11 @@
           <c:showBubbleSize val="0"/>
         </c:dLbls>
         <c:gapWidth val="100"/>
-        <c:axId val="399929768"/>
-        <c:axId val="399921536"/>
+        <c:axId val="219151088"/>
+        <c:axId val="219146776"/>
       </c:barChart>
       <c:catAx>
-        <c:axId val="399929768"/>
+        <c:axId val="219151088"/>
         <c:scaling>
           <c:orientation val="minMax"/>
         </c:scaling>
@@ -3939,7 +3937,7 @@
             </a:solidFill>
           </a:ln>
         </c:spPr>
-        <c:crossAx val="399921536"/>
+        <c:crossAx val="219146776"/>
         <c:crosses val="autoZero"/>
         <c:auto val="1"/>
         <c:lblAlgn val="ctr"/>
@@ -3947,7 +3945,7 @@
         <c:noMultiLvlLbl val="1"/>
       </c:catAx>
       <c:valAx>
-        <c:axId val="399921536"/>
+        <c:axId val="219146776"/>
         <c:scaling>
           <c:orientation val="minMax"/>
         </c:scaling>
@@ -3973,7 +3971,7 @@
             </a:solidFill>
           </a:ln>
         </c:spPr>
-        <c:crossAx val="399929768"/>
+        <c:crossAx val="219151088"/>
         <c:crosses val="autoZero"/>
         <c:crossBetween val="between"/>
       </c:valAx>
@@ -4194,11 +4192,11 @@
           <c:showBubbleSize val="0"/>
         </c:dLbls>
         <c:gapWidth val="100"/>
-        <c:axId val="329814920"/>
-        <c:axId val="329808648"/>
+        <c:axId val="219149912"/>
+        <c:axId val="219153440"/>
       </c:barChart>
       <c:catAx>
-        <c:axId val="329814920"/>
+        <c:axId val="219149912"/>
         <c:scaling>
           <c:orientation val="minMax"/>
         </c:scaling>
@@ -4215,7 +4213,7 @@
             </a:solidFill>
           </a:ln>
         </c:spPr>
-        <c:crossAx val="329808648"/>
+        <c:crossAx val="219153440"/>
         <c:crosses val="autoZero"/>
         <c:auto val="1"/>
         <c:lblAlgn val="ctr"/>
@@ -4223,7 +4221,7 @@
         <c:noMultiLvlLbl val="1"/>
       </c:catAx>
       <c:valAx>
-        <c:axId val="329808648"/>
+        <c:axId val="219153440"/>
         <c:scaling>
           <c:orientation val="minMax"/>
         </c:scaling>
@@ -4249,7 +4247,7 @@
             </a:solidFill>
           </a:ln>
         </c:spPr>
-        <c:crossAx val="329814920"/>
+        <c:crossAx val="219149912"/>
         <c:crosses val="autoZero"/>
         <c:crossBetween val="between"/>
       </c:valAx>
@@ -4264,7 +4262,6 @@
     </c:plotArea>
     <c:legend>
       <c:legendPos val="r"/>
-      <c:layout/>
       <c:overlay val="0"/>
       <c:spPr>
         <a:noFill/>
@@ -4416,11 +4413,11 @@
           <c:showBubbleSize val="0"/>
         </c:dLbls>
         <c:gapWidth val="100"/>
-        <c:axId val="399926240"/>
-        <c:axId val="399923496"/>
+        <c:axId val="219146384"/>
+        <c:axId val="219145992"/>
       </c:barChart>
       <c:catAx>
-        <c:axId val="399926240"/>
+        <c:axId val="219146384"/>
         <c:scaling>
           <c:orientation val="minMax"/>
         </c:scaling>
@@ -4437,7 +4434,7 @@
             </a:solidFill>
           </a:ln>
         </c:spPr>
-        <c:crossAx val="399923496"/>
+        <c:crossAx val="219145992"/>
         <c:crosses val="autoZero"/>
         <c:auto val="1"/>
         <c:lblAlgn val="ctr"/>
@@ -4445,7 +4442,7 @@
         <c:noMultiLvlLbl val="1"/>
       </c:catAx>
       <c:valAx>
-        <c:axId val="399923496"/>
+        <c:axId val="219145992"/>
         <c:scaling>
           <c:orientation val="minMax"/>
         </c:scaling>
@@ -4471,7 +4468,7 @@
             </a:solidFill>
           </a:ln>
         </c:spPr>
-        <c:crossAx val="399926240"/>
+        <c:crossAx val="219146384"/>
         <c:crosses val="autoZero"/>
         <c:crossBetween val="between"/>
       </c:valAx>
@@ -4486,7 +4483,6 @@
     </c:plotArea>
     <c:legend>
       <c:legendPos val="r"/>
-      <c:layout/>
       <c:overlay val="0"/>
       <c:spPr>
         <a:noFill/>
@@ -4626,11 +4622,11 @@
           <c:showBubbleSize val="0"/>
         </c:dLbls>
         <c:gapWidth val="100"/>
-        <c:axId val="398087048"/>
-        <c:axId val="398092928"/>
+        <c:axId val="219151872"/>
+        <c:axId val="220071832"/>
       </c:barChart>
       <c:catAx>
-        <c:axId val="398087048"/>
+        <c:axId val="219151872"/>
         <c:scaling>
           <c:orientation val="minMax"/>
         </c:scaling>
@@ -4647,7 +4643,7 @@
             </a:solidFill>
           </a:ln>
         </c:spPr>
-        <c:crossAx val="398092928"/>
+        <c:crossAx val="220071832"/>
         <c:crosses val="autoZero"/>
         <c:auto val="1"/>
         <c:lblAlgn val="ctr"/>
@@ -4655,7 +4651,7 @@
         <c:noMultiLvlLbl val="1"/>
       </c:catAx>
       <c:valAx>
-        <c:axId val="398092928"/>
+        <c:axId val="220071832"/>
         <c:scaling>
           <c:orientation val="minMax"/>
         </c:scaling>
@@ -4681,7 +4677,7 @@
             </a:solidFill>
           </a:ln>
         </c:spPr>
-        <c:crossAx val="398087048"/>
+        <c:crossAx val="219151872"/>
         <c:crosses val="autoZero"/>
         <c:crossBetween val="between"/>
       </c:valAx>
@@ -4696,7 +4692,6 @@
     </c:plotArea>
     <c:legend>
       <c:legendPos val="r"/>
-      <c:layout/>
       <c:overlay val="0"/>
       <c:spPr>
         <a:noFill/>
@@ -4836,11 +4831,11 @@
           <c:showBubbleSize val="0"/>
         </c:dLbls>
         <c:gapWidth val="100"/>
-        <c:axId val="332391144"/>
-        <c:axId val="332393496"/>
+        <c:axId val="220069088"/>
+        <c:axId val="220072224"/>
       </c:barChart>
       <c:catAx>
-        <c:axId val="332391144"/>
+        <c:axId val="220069088"/>
         <c:scaling>
           <c:orientation val="minMax"/>
         </c:scaling>
@@ -4857,7 +4852,7 @@
             </a:solidFill>
           </a:ln>
         </c:spPr>
-        <c:crossAx val="332393496"/>
+        <c:crossAx val="220072224"/>
         <c:crosses val="autoZero"/>
         <c:auto val="1"/>
         <c:lblAlgn val="ctr"/>
@@ -4865,7 +4860,7 @@
         <c:noMultiLvlLbl val="1"/>
       </c:catAx>
       <c:valAx>
-        <c:axId val="332393496"/>
+        <c:axId val="220072224"/>
         <c:scaling>
           <c:orientation val="minMax"/>
         </c:scaling>
@@ -4891,7 +4886,7 @@
             </a:solidFill>
           </a:ln>
         </c:spPr>
-        <c:crossAx val="332391144"/>
+        <c:crossAx val="220069088"/>
         <c:crosses val="autoZero"/>
         <c:crossBetween val="between"/>
       </c:valAx>
@@ -4906,7 +4901,6 @@
     </c:plotArea>
     <c:legend>
       <c:legendPos val="r"/>
-      <c:layout/>
       <c:overlay val="0"/>
       <c:spPr>
         <a:noFill/>
@@ -18937,16 +18931,16 @@
               </a:lnSpc>
             </a:pPr>
             <a:r>
-              <a:rPr lang="es-MX" sz="4400" strike="noStrike">
+              <a:rPr lang="es-MX" sz="4400" strike="noStrike" dirty="0" smtClean="0">
                 <a:solidFill>
                   <a:srgbClr val="000000"/>
                 </a:solidFill>
                 <a:latin typeface="Calibri"/>
                 <a:ea typeface="DejaVu Sans"/>
               </a:rPr>
-              <a:t>Esfuerzo</a:t>
+              <a:t>Esfuerzo área de ventas</a:t>
             </a:r>
-            <a:endParaRPr/>
+            <a:endParaRPr dirty="0"/>
           </a:p>
         </p:txBody>
       </p:sp>
@@ -19054,81 +19048,19 @@
                 <a:latin typeface="Times New Roman"/>
                 <a:ea typeface="DejaVu Sans"/>
               </a:rPr>
-              <a:t>Análisis: No se presenta un esfuerzo alto en ninguna de las áreas por lo que se puede asumir que el mes fue poco laborable.</a:t>
+              <a:t>Análisis: </a:t>
             </a:r>
-            <a:endParaRPr dirty="0"/>
-          </a:p>
-        </p:txBody>
-      </p:sp>
-      <p:pic>
-        <p:nvPicPr>
-          <p:cNvPr id="211" name="Imagen 210"/>
-          <p:cNvPicPr/>
-          <p:nvPr/>
-        </p:nvPicPr>
-        <p:blipFill>
-          <a:blip r:embed="rId2"/>
-          <a:stretch/>
-        </p:blipFill>
-        <p:spPr>
-          <a:xfrm>
-            <a:off x="72000" y="1076400"/>
-            <a:ext cx="8867520" cy="1154160"/>
-          </a:xfrm>
-          <a:prstGeom prst="rect">
-            <a:avLst/>
-          </a:prstGeom>
-          <a:ln>
-            <a:noFill/>
-          </a:ln>
-        </p:spPr>
-      </p:pic>
-      <p:sp>
-        <p:nvSpPr>
-          <p:cNvPr id="213" name="CustomShape 4"/>
-          <p:cNvSpPr/>
-          <p:nvPr/>
-        </p:nvSpPr>
-        <p:spPr>
-          <a:xfrm>
-            <a:off x="288000" y="2304000"/>
-            <a:ext cx="4391280" cy="345600"/>
-          </a:xfrm>
-          <a:prstGeom prst="rect">
-            <a:avLst/>
-          </a:prstGeom>
-          <a:noFill/>
-          <a:ln>
-            <a:noFill/>
-          </a:ln>
-        </p:spPr>
-        <p:style>
-          <a:lnRef idx="0">
-            <a:scrgbClr r="0" g="0" b="0"/>
-          </a:lnRef>
-          <a:fillRef idx="0">
-            <a:scrgbClr r="0" g="0" b="0"/>
-          </a:fillRef>
-          <a:effectRef idx="0">
-            <a:scrgbClr r="0" g="0" b="0"/>
-          </a:effectRef>
-          <a:fontRef idx="minor"/>
-        </p:style>
-        <p:txBody>
-          <a:bodyPr lIns="90000" tIns="45000" rIns="90000" bIns="45000"/>
-          <a:lstStyle/>
-          <a:p>
             <a:r>
-              <a:rPr lang="es-MX" strike="noStrike">
+              <a:rPr lang="es-MX" strike="noStrike" dirty="0" smtClean="0">
                 <a:solidFill>
                   <a:srgbClr val="000000"/>
                 </a:solidFill>
-                <a:latin typeface="Arial"/>
+                <a:latin typeface="Times New Roman"/>
                 <a:ea typeface="DejaVu Sans"/>
               </a:rPr>
-              <a:t>Esfuerzo área de ventas</a:t>
+              <a:t>El esfuerzo del área de ventas se encuentra arriba del 50 porciento lo cual representa un nivel bajo en ventas. Soporte esta casi por llegar a su meta.</a:t>
             </a:r>
-            <a:endParaRPr/>
+            <a:endParaRPr dirty="0"/>
           </a:p>
         </p:txBody>
       </p:sp>
@@ -19141,21 +19073,45 @@
           <p:nvPr>
             <p:extLst>
               <p:ext uri="{D42A27DB-BD31-4B8C-83A1-F6EECF244321}">
-                <p14:modId xmlns:p14="http://schemas.microsoft.com/office/powerpoint/2010/main" val="2917505399"/>
+                <p14:modId xmlns:p14="http://schemas.microsoft.com/office/powerpoint/2010/main" val="2818048225"/>
               </p:ext>
             </p:extLst>
           </p:nvPr>
         </p:nvGraphicFramePr>
         <p:xfrm>
-          <a:off x="761001" y="2649600"/>
+          <a:off x="1192789" y="2963499"/>
           <a:ext cx="4319240" cy="3516840"/>
         </p:xfrm>
         <a:graphic>
           <a:graphicData uri="http://schemas.openxmlformats.org/drawingml/2006/chart">
-            <c:chart xmlns:c="http://schemas.openxmlformats.org/drawingml/2006/chart" xmlns:r="http://schemas.openxmlformats.org/officeDocument/2006/relationships" r:id="rId3"/>
+            <c:chart xmlns:c="http://schemas.openxmlformats.org/drawingml/2006/chart" xmlns:r="http://schemas.openxmlformats.org/officeDocument/2006/relationships" r:id="rId2"/>
           </a:graphicData>
         </a:graphic>
       </p:graphicFrame>
+      <p:pic>
+        <p:nvPicPr>
+          <p:cNvPr id="2" name="Imagen 1"/>
+          <p:cNvPicPr>
+            <a:picLocks noChangeAspect="1"/>
+          </p:cNvPicPr>
+          <p:nvPr/>
+        </p:nvPicPr>
+        <p:blipFill>
+          <a:blip r:embed="rId3"/>
+          <a:stretch>
+            <a:fillRect/>
+          </a:stretch>
+        </p:blipFill>
+        <p:spPr>
+          <a:xfrm>
+            <a:off x="1192789" y="1215816"/>
+            <a:ext cx="6832095" cy="1504924"/>
+          </a:xfrm>
+          <a:prstGeom prst="rect">
+            <a:avLst/>
+          </a:prstGeom>
+        </p:spPr>
+      </p:pic>
     </p:spTree>
   </p:cSld>
   <p:clrMapOvr>

</xml_diff>